<commit_message>
notation change in documents from \beta and \xi to \beta_A and \beta_P (\beta\xi=\beta_P and \beta(1-\xi)=beta_A)
</commit_message>
<xml_diff>
--- a/heroin_model_formulation/added_fentanyl_removed_delta/heroin_schematic_without_delta_new_design.pptx
+++ b/heroin_model_formulation/added_fentanyl_removed_delta/heroin_schematic_without_delta_new_design.pptx
@@ -301,7 +301,7 @@
           <a:lstStyle/>
           <a:p>
             <a:fld id="{5A3E0873-EA00-D142-ACA6-784333225662}" type="datetimeFigureOut">
-              <a:t>8/28/18</a:t>
+              <a:t>11/13/18</a:t>
             </a:fld>
             <a:endParaRPr lang="en-US"/>
           </a:p>
@@ -467,7 +467,7 @@
           <a:lstStyle/>
           <a:p>
             <a:fld id="{5A3E0873-EA00-D142-ACA6-784333225662}" type="datetimeFigureOut">
-              <a:t>8/28/18</a:t>
+              <a:t>11/13/18</a:t>
             </a:fld>
             <a:endParaRPr lang="en-US"/>
           </a:p>
@@ -643,7 +643,7 @@
           <a:lstStyle/>
           <a:p>
             <a:fld id="{5A3E0873-EA00-D142-ACA6-784333225662}" type="datetimeFigureOut">
-              <a:t>8/28/18</a:t>
+              <a:t>11/13/18</a:t>
             </a:fld>
             <a:endParaRPr lang="en-US"/>
           </a:p>
@@ -809,7 +809,7 @@
           <a:lstStyle/>
           <a:p>
             <a:fld id="{5A3E0873-EA00-D142-ACA6-784333225662}" type="datetimeFigureOut">
-              <a:t>8/28/18</a:t>
+              <a:t>11/13/18</a:t>
             </a:fld>
             <a:endParaRPr lang="en-US"/>
           </a:p>
@@ -1052,7 +1052,7 @@
           <a:lstStyle/>
           <a:p>
             <a:fld id="{5A3E0873-EA00-D142-ACA6-784333225662}" type="datetimeFigureOut">
-              <a:t>8/28/18</a:t>
+              <a:t>11/13/18</a:t>
             </a:fld>
             <a:endParaRPr lang="en-US"/>
           </a:p>
@@ -1335,7 +1335,7 @@
           <a:lstStyle/>
           <a:p>
             <a:fld id="{5A3E0873-EA00-D142-ACA6-784333225662}" type="datetimeFigureOut">
-              <a:t>8/28/18</a:t>
+              <a:t>11/13/18</a:t>
             </a:fld>
             <a:endParaRPr lang="en-US"/>
           </a:p>
@@ -1752,7 +1752,7 @@
           <a:lstStyle/>
           <a:p>
             <a:fld id="{5A3E0873-EA00-D142-ACA6-784333225662}" type="datetimeFigureOut">
-              <a:t>8/28/18</a:t>
+              <a:t>11/13/18</a:t>
             </a:fld>
             <a:endParaRPr lang="en-US"/>
           </a:p>
@@ -1867,7 +1867,7 @@
           <a:lstStyle/>
           <a:p>
             <a:fld id="{5A3E0873-EA00-D142-ACA6-784333225662}" type="datetimeFigureOut">
-              <a:t>8/28/18</a:t>
+              <a:t>11/13/18</a:t>
             </a:fld>
             <a:endParaRPr lang="en-US"/>
           </a:p>
@@ -1960,7 +1960,7 @@
           <a:lstStyle/>
           <a:p>
             <a:fld id="{5A3E0873-EA00-D142-ACA6-784333225662}" type="datetimeFigureOut">
-              <a:t>8/28/18</a:t>
+              <a:t>11/13/18</a:t>
             </a:fld>
             <a:endParaRPr lang="en-US"/>
           </a:p>
@@ -2233,7 +2233,7 @@
           <a:lstStyle/>
           <a:p>
             <a:fld id="{5A3E0873-EA00-D142-ACA6-784333225662}" type="datetimeFigureOut">
-              <a:t>8/28/18</a:t>
+              <a:t>11/13/18</a:t>
             </a:fld>
             <a:endParaRPr lang="en-US"/>
           </a:p>
@@ -2483,7 +2483,7 @@
           <a:lstStyle/>
           <a:p>
             <a:fld id="{5A3E0873-EA00-D142-ACA6-784333225662}" type="datetimeFigureOut">
-              <a:t>8/28/18</a:t>
+              <a:t>11/13/18</a:t>
             </a:fld>
             <a:endParaRPr lang="en-US"/>
           </a:p>
@@ -2692,7 +2692,7 @@
           </a:lstStyle>
           <a:p>
             <a:fld id="{5A3E0873-EA00-D142-ACA6-784333225662}" type="datetimeFigureOut">
-              <a:t>8/28/18</a:t>
+              <a:t>11/13/18</a:t>
             </a:fld>
             <a:endParaRPr lang="en-US"/>
           </a:p>
@@ -3760,7 +3760,22 @@
                 <a:ea typeface="Times New Roman" charset="0"/>
                 <a:cs typeface="Times New Roman" charset="0"/>
               </a:rPr>
-              <a:t>β(1-ξ)SA</a:t>
+              <a:t>β</a:t>
+            </a:r>
+            <a:r>
+              <a:rPr lang="en-US" sz="1400" baseline="-25000" dirty="0">
+                <a:latin typeface="Times New Roman"/>
+                <a:cs typeface="Times New Roman"/>
+              </a:rPr>
+              <a:t>A</a:t>
+            </a:r>
+            <a:r>
+              <a:rPr lang="en-US" sz="1400" dirty="0">
+                <a:latin typeface="Times New Roman" charset="0"/>
+                <a:ea typeface="Times New Roman" charset="0"/>
+                <a:cs typeface="Times New Roman" charset="0"/>
+              </a:rPr>
+              <a:t>SA</a:t>
             </a:r>
           </a:p>
         </p:txBody>
@@ -4160,18 +4175,20 @@
               <a:t>β</a:t>
             </a:r>
             <a:r>
-              <a:rPr lang="en-US" sz="1400" dirty="0" err="1">
+              <a:rPr lang="en-US" sz="1400" baseline="-25000" dirty="0">
+                <a:latin typeface="Times New Roman"/>
+                <a:cs typeface="Times New Roman"/>
+              </a:rPr>
+              <a:t>P</a:t>
+            </a:r>
+            <a:r>
+              <a:rPr lang="en-US" sz="1400" dirty="0">
                 <a:latin typeface="Times New Roman" charset="0"/>
                 <a:ea typeface="Times New Roman" charset="0"/>
                 <a:cs typeface="Times New Roman" charset="0"/>
               </a:rPr>
-              <a:t>ξSP</a:t>
-            </a:r>
-            <a:endParaRPr lang="en-US" sz="1400" dirty="0">
-              <a:latin typeface="Times New Roman" charset="0"/>
-              <a:ea typeface="Times New Roman" charset="0"/>
-              <a:cs typeface="Times New Roman" charset="0"/>
-            </a:endParaRPr>
+              <a:t>SP</a:t>
+            </a:r>
           </a:p>
         </p:txBody>
       </p:sp>

</xml_diff>